<commit_message>
Examples for lec 6,7
</commit_message>
<xml_diff>
--- a/Lectures/py_lec_6.pptx
+++ b/Lectures/py_lec_6.pptx
@@ -211,7 +211,7 @@
           <a:p>
             <a:fld id="{FF08647B-1F9F-41A4-B867-46FC175D451E}" type="datetimeFigureOut">
               <a:rPr lang="ru-RU" smtClean="0"/>
-              <a:t>04.10.2021</a:t>
+              <a:t>13.10.2021</a:t>
             </a:fld>
             <a:endParaRPr lang="ru-RU"/>
           </a:p>
@@ -21227,7 +21227,7 @@
             </a:lvl9pPr>
           </a:lstStyle>
           <a:p>
-            <a:pPr marL="342900" marR="0" lvl="0" indent="-342900" algn="just" defTabSz="914400" rtl="0" eaLnBrk="0" fontAlgn="base" latinLnBrk="0" hangingPunct="0">
+            <a:pPr marL="457200" marR="0" lvl="0" indent="-457200" algn="just" defTabSz="914400" rtl="0" eaLnBrk="0" fontAlgn="base" latinLnBrk="0" hangingPunct="0">
               <a:lnSpc>
                 <a:spcPct val="100000"/>
               </a:lnSpc>
@@ -21240,7 +21240,7 @@
               <a:buClrTx/>
               <a:buSzTx/>
               <a:buFont typeface="+mj-lt"/>
-              <a:buAutoNum type="arabicPeriod" startAt="5"/>
+              <a:buAutoNum type="arabicPeriod" startAt="4"/>
               <a:tabLst/>
               <a:defRPr/>
             </a:pPr>

</xml_diff>